<commit_message>
homework of advanced algorithm in 2018 fall
</commit_message>
<xml_diff>
--- a/A Greedy Heuristic Deployment strategy for VNFs<ver3.0>.pptx
+++ b/A Greedy Heuristic Deployment strategy for VNFs<ver3.0>.pptx
@@ -216,7 +216,7 @@
           <a:p>
             <a:fld id="{F882EEB1-3D64-4C5C-81C1-297EF2F2940E}" type="datetimeFigureOut">
               <a:rPr lang="zh-CN" altLang="en-US" smtClean="0"/>
-              <a:t>2017/12/10</a:t>
+              <a:t>2017/12/12</a:t>
             </a:fld>
             <a:endParaRPr lang="zh-CN" altLang="en-US"/>
           </a:p>
@@ -727,7 +727,7 @@
                 <a:ea typeface="+mn-ea"/>
                 <a:cs typeface="+mn-cs"/>
               </a:rPr>
-              <a:t>As more and more service function chain get into the network, and more and more node has been deployed with service function, and for a new coming service function chain, we </a:t>
+              <a:t>As more and more service function chain get into the network, and more and more node has been deployed with service functions, and for a new coming service function chain, we </a:t>
             </a:r>
             <a:r>
               <a:rPr lang="en-US" altLang="zh-CN" sz="1200" kern="1200" dirty="0" err="1" smtClean="0">
@@ -751,7 +751,7 @@
                 <a:ea typeface="+mn-ea"/>
                 <a:cs typeface="+mn-cs"/>
               </a:rPr>
-              <a:t> to find a node chain to deploy, we have 2 choices: 1. select a empty node, deploy the network function in the node. The other. reuse some nodes if the rest computing resources is enough. if the first choice is used, the whole physical nodes number is high which will increase the cost of nodes of the whole network. If the second choice is used, the cost of the edge will increase. And How to balance reused nodes and bandwidth costs is a considerable problem!</a:t>
+              <a:t> to find a node chain to deploy, we have 2 choices: one, select a empty node, deploy the network function in the node. The other. reuse some nodes if the rest computing resources is enough. if the first choice is used, the whole physical nodes number is high which will increase the cost of nodes of the whole network. If the second choice is used, the cost of the edge will increase. And How to balance reused nodes and bandwidth costs is a considerable problem!</a:t>
             </a:r>
             <a:endParaRPr lang="zh-CN" altLang="zh-CN" sz="1200" kern="1200" dirty="0" smtClean="0">
               <a:solidFill>
@@ -936,7 +936,175 @@
                     <a:ea typeface="+mn-ea"/>
                     <a:cs typeface="+mn-cs"/>
                   </a:rPr>
-                  <a:t>, which has A,B and C functions. Node d has been deployed with A, node e has been deployed with B, node f has been deployed with C. and node </a:t>
+                  <a:t>, which has A,B and C functions. Node d has been deployed </a:t>
+                </a:r>
+                <a:r>
+                  <a:rPr lang="en-US" altLang="zh-CN" sz="1200" kern="1200" dirty="0" smtClean="0">
+                    <a:solidFill>
+                      <a:schemeClr val="tx1"/>
+                    </a:solidFill>
+                    <a:effectLst/>
+                    <a:latin typeface="+mn-lt"/>
+                    <a:ea typeface="+mn-ea"/>
+                    <a:cs typeface="+mn-cs"/>
+                  </a:rPr>
+                  <a:t>with</a:t>
+                </a:r>
+                <a:r>
+                  <a:rPr lang="zh-CN" altLang="en-US" sz="1200" kern="1200" baseline="0" dirty="0" smtClean="0">
+                    <a:solidFill>
+                      <a:schemeClr val="tx1"/>
+                    </a:solidFill>
+                    <a:effectLst/>
+                    <a:latin typeface="+mn-lt"/>
+                    <a:ea typeface="+mn-ea"/>
+                    <a:cs typeface="+mn-cs"/>
+                  </a:rPr>
+                  <a:t> </a:t>
+                </a:r>
+                <a:r>
+                  <a:rPr lang="en-US" altLang="zh-CN" sz="1200" kern="1200" baseline="0" dirty="0" smtClean="0">
+                    <a:solidFill>
+                      <a:schemeClr val="tx1"/>
+                    </a:solidFill>
+                    <a:effectLst/>
+                    <a:latin typeface="+mn-lt"/>
+                    <a:ea typeface="+mn-ea"/>
+                    <a:cs typeface="+mn-cs"/>
+                  </a:rPr>
+                  <a:t>function</a:t>
+                </a:r>
+                <a:r>
+                  <a:rPr lang="en-US" altLang="zh-CN" sz="1200" kern="1200" dirty="0" smtClean="0">
+                    <a:solidFill>
+                      <a:schemeClr val="tx1"/>
+                    </a:solidFill>
+                    <a:effectLst/>
+                    <a:latin typeface="+mn-lt"/>
+                    <a:ea typeface="+mn-ea"/>
+                    <a:cs typeface="+mn-cs"/>
+                  </a:rPr>
+                  <a:t> </a:t>
+                </a:r>
+                <a:r>
+                  <a:rPr lang="en-US" altLang="zh-CN" sz="1200" kern="1200" dirty="0">
+                    <a:solidFill>
+                      <a:schemeClr val="tx1"/>
+                    </a:solidFill>
+                    <a:effectLst/>
+                    <a:latin typeface="+mn-lt"/>
+                    <a:ea typeface="+mn-ea"/>
+                    <a:cs typeface="+mn-cs"/>
+                  </a:rPr>
+                  <a:t>A, node e has been deployed </a:t>
+                </a:r>
+                <a:r>
+                  <a:rPr lang="en-US" altLang="zh-CN" sz="1200" kern="1200" dirty="0" smtClean="0">
+                    <a:solidFill>
+                      <a:schemeClr val="tx1"/>
+                    </a:solidFill>
+                    <a:effectLst/>
+                    <a:latin typeface="+mn-lt"/>
+                    <a:ea typeface="+mn-ea"/>
+                    <a:cs typeface="+mn-cs"/>
+                  </a:rPr>
+                  <a:t>with</a:t>
+                </a:r>
+                <a:r>
+                  <a:rPr lang="zh-CN" altLang="en-US" sz="1200" kern="1200" baseline="0" dirty="0" smtClean="0">
+                    <a:solidFill>
+                      <a:schemeClr val="tx1"/>
+                    </a:solidFill>
+                    <a:effectLst/>
+                    <a:latin typeface="+mn-lt"/>
+                    <a:ea typeface="+mn-ea"/>
+                    <a:cs typeface="+mn-cs"/>
+                  </a:rPr>
+                  <a:t> </a:t>
+                </a:r>
+                <a:r>
+                  <a:rPr lang="en-US" altLang="zh-CN" sz="1200" kern="1200" baseline="0" dirty="0" smtClean="0">
+                    <a:solidFill>
+                      <a:schemeClr val="tx1"/>
+                    </a:solidFill>
+                    <a:effectLst/>
+                    <a:latin typeface="+mn-lt"/>
+                    <a:ea typeface="+mn-ea"/>
+                    <a:cs typeface="+mn-cs"/>
+                  </a:rPr>
+                  <a:t>function</a:t>
+                </a:r>
+                <a:r>
+                  <a:rPr lang="en-US" altLang="zh-CN" sz="1200" kern="1200" dirty="0" smtClean="0">
+                    <a:solidFill>
+                      <a:schemeClr val="tx1"/>
+                    </a:solidFill>
+                    <a:effectLst/>
+                    <a:latin typeface="+mn-lt"/>
+                    <a:ea typeface="+mn-ea"/>
+                    <a:cs typeface="+mn-cs"/>
+                  </a:rPr>
+                  <a:t> </a:t>
+                </a:r>
+                <a:r>
+                  <a:rPr lang="en-US" altLang="zh-CN" sz="1200" kern="1200" dirty="0">
+                    <a:solidFill>
+                      <a:schemeClr val="tx1"/>
+                    </a:solidFill>
+                    <a:effectLst/>
+                    <a:latin typeface="+mn-lt"/>
+                    <a:ea typeface="+mn-ea"/>
+                    <a:cs typeface="+mn-cs"/>
+                  </a:rPr>
+                  <a:t>B, node f has been deployed </a:t>
+                </a:r>
+                <a:r>
+                  <a:rPr lang="en-US" altLang="zh-CN" sz="1200" kern="1200" dirty="0" smtClean="0">
+                    <a:solidFill>
+                      <a:schemeClr val="tx1"/>
+                    </a:solidFill>
+                    <a:effectLst/>
+                    <a:latin typeface="+mn-lt"/>
+                    <a:ea typeface="+mn-ea"/>
+                    <a:cs typeface="+mn-cs"/>
+                  </a:rPr>
+                  <a:t>with</a:t>
+                </a:r>
+                <a:r>
+                  <a:rPr lang="zh-CN" altLang="en-US" sz="1200" kern="1200" dirty="0" smtClean="0">
+                    <a:solidFill>
+                      <a:schemeClr val="tx1"/>
+                    </a:solidFill>
+                    <a:effectLst/>
+                    <a:latin typeface="+mn-lt"/>
+                    <a:ea typeface="+mn-ea"/>
+                    <a:cs typeface="+mn-cs"/>
+                  </a:rPr>
+                  <a:t> </a:t>
+                </a:r>
+                <a:r>
+                  <a:rPr lang="en-US" altLang="zh-CN" sz="1200" kern="1200" dirty="0" smtClean="0">
+                    <a:solidFill>
+                      <a:schemeClr val="tx1"/>
+                    </a:solidFill>
+                    <a:effectLst/>
+                    <a:latin typeface="+mn-lt"/>
+                    <a:ea typeface="+mn-ea"/>
+                    <a:cs typeface="+mn-cs"/>
+                  </a:rPr>
+                  <a:t>function </a:t>
+                </a:r>
+                <a:r>
+                  <a:rPr lang="en-US" altLang="zh-CN" sz="1200" kern="1200" dirty="0">
+                    <a:solidFill>
+                      <a:schemeClr val="tx1"/>
+                    </a:solidFill>
+                    <a:effectLst/>
+                    <a:latin typeface="+mn-lt"/>
+                    <a:ea typeface="+mn-ea"/>
+                    <a:cs typeface="+mn-cs"/>
+                  </a:rPr>
+                  <a:t>C. and node </a:t>
                 </a:r>
                 <a:r>
                   <a:rPr lang="en-US" altLang="zh-CN" sz="1200" kern="1200" dirty="0" err="1">
@@ -1008,7 +1176,31 @@
                     <a:ea typeface="+mn-ea"/>
                     <a:cs typeface="+mn-cs"/>
                   </a:rPr>
-                  <a:t>the bandwidth is 2*bandwidth(AB)+2*bandwidth(BC). But there will be 3 empty node still to other functions to deploy. </a:t>
+                  <a:t>the bandwidth is 2*bandwidth(AB)+2*bandwidth(BC). But there will be 3 empty </a:t>
+                </a:r>
+                <a:r>
+                  <a:rPr lang="en-US" altLang="zh-CN" sz="1200" kern="1200" dirty="0" smtClean="0">
+                    <a:solidFill>
+                      <a:schemeClr val="tx1"/>
+                    </a:solidFill>
+                    <a:effectLst/>
+                    <a:latin typeface="+mn-lt"/>
+                    <a:ea typeface="+mn-ea"/>
+                    <a:cs typeface="+mn-cs"/>
+                  </a:rPr>
+                  <a:t>nodes </a:t>
+                </a:r>
+                <a:r>
+                  <a:rPr lang="en-US" altLang="zh-CN" sz="1200" kern="1200" dirty="0">
+                    <a:solidFill>
+                      <a:schemeClr val="tx1"/>
+                    </a:solidFill>
+                    <a:effectLst/>
+                    <a:latin typeface="+mn-lt"/>
+                    <a:ea typeface="+mn-ea"/>
+                    <a:cs typeface="+mn-cs"/>
+                  </a:rPr>
+                  <a:t>still to other functions to deploy. </a:t>
                 </a:r>
                 <a:endParaRPr lang="zh-CN" altLang="zh-CN" sz="1200" kern="1200" dirty="0">
                   <a:solidFill>
@@ -2845,7 +3037,31 @@
                 <a:ea typeface="+mn-ea"/>
                 <a:cs typeface="+mn-cs"/>
               </a:rPr>
-              <a:t>in R1 is 10 and the floating requirement of node a is 5 and the possibility is 0.3. the fixing requirement of node </a:t>
+              <a:t>in R1 is 10 and the floating requirement </a:t>
+            </a:r>
+            <a:r>
+              <a:rPr lang="en-US" altLang="zh-CN" sz="1200" kern="1200" dirty="0" smtClean="0">
+                <a:solidFill>
+                  <a:schemeClr val="tx1"/>
+                </a:solidFill>
+                <a:effectLst/>
+                <a:latin typeface="+mn-lt"/>
+                <a:ea typeface="+mn-ea"/>
+                <a:cs typeface="+mn-cs"/>
+              </a:rPr>
+              <a:t>is </a:t>
+            </a:r>
+            <a:r>
+              <a:rPr lang="en-US" altLang="zh-CN" sz="1200" kern="1200" dirty="0" smtClean="0">
+                <a:solidFill>
+                  <a:schemeClr val="tx1"/>
+                </a:solidFill>
+                <a:effectLst/>
+                <a:latin typeface="+mn-lt"/>
+                <a:ea typeface="+mn-ea"/>
+                <a:cs typeface="+mn-cs"/>
+              </a:rPr>
+              <a:t>5 and the possibility is 0.3. the fixing requirement of node </a:t>
             </a:r>
             <a:r>
               <a:rPr lang="en-US" altLang="zh-CN" sz="1200" b="1" kern="1200" dirty="0" smtClean="0">
@@ -2869,7 +3085,31 @@
                 <a:ea typeface="+mn-ea"/>
                 <a:cs typeface="+mn-cs"/>
               </a:rPr>
-              <a:t>in R2 is 10 and the floating requirement of node a is 5 and the possibility is 0.3. If they want to deploy in a node with 25 computing resources.</a:t>
+              <a:t>in R2 is 10 and the floating requirement </a:t>
+            </a:r>
+            <a:r>
+              <a:rPr lang="en-US" altLang="zh-CN" sz="1200" kern="1200" dirty="0" smtClean="0">
+                <a:solidFill>
+                  <a:schemeClr val="tx1"/>
+                </a:solidFill>
+                <a:effectLst/>
+                <a:latin typeface="+mn-lt"/>
+                <a:ea typeface="+mn-ea"/>
+                <a:cs typeface="+mn-cs"/>
+              </a:rPr>
+              <a:t>is </a:t>
+            </a:r>
+            <a:r>
+              <a:rPr lang="en-US" altLang="zh-CN" sz="1200" kern="1200" dirty="0" smtClean="0">
+                <a:solidFill>
+                  <a:schemeClr val="tx1"/>
+                </a:solidFill>
+                <a:effectLst/>
+                <a:latin typeface="+mn-lt"/>
+                <a:ea typeface="+mn-ea"/>
+                <a:cs typeface="+mn-cs"/>
+              </a:rPr>
+              <a:t>5 and the possibility is 0.5. If they want to deploy in a node with 25 computing resources.</a:t>
             </a:r>
             <a:endParaRPr lang="zh-CN" altLang="zh-CN" sz="1200" kern="1200" dirty="0" smtClean="0">
               <a:solidFill>
@@ -2966,19 +3206,6 @@
           <a:bodyPr/>
           <a:lstStyle/>
           <a:p>
-            <a:r>
-              <a:rPr lang="zh-CN" altLang="en-US" dirty="0" smtClean="0"/>
-              <a:t>为什么对于无限多服务链可以成立，是因为这是相比较服务链来说，虚拟机上的节点和资源是巨大的，因此重用因子主要取决于服务链，而不取决于虚拟机。</a:t>
-            </a:r>
-            <a:endParaRPr lang="en-US" altLang="zh-CN" dirty="0" smtClean="0"/>
-          </a:p>
-          <a:p>
-            <a:r>
-              <a:rPr lang="zh-CN" altLang="en-US" dirty="0" smtClean="0"/>
-              <a:t>同时这里节点的可用和资源的可用是一个向量的比较，而非标量的比较。</a:t>
-            </a:r>
-          </a:p>
-          <a:p>
             <a:pPr marL="0" marR="0" lvl="0" indent="0" algn="l" defTabSz="914400" rtl="0" eaLnBrk="1" fontAlgn="auto" latinLnBrk="0" hangingPunct="1">
               <a:lnSpc>
                 <a:spcPct val="100000"/>
@@ -3006,7 +3233,43 @@
                 <a:ea typeface="+mn-ea"/>
                 <a:cs typeface="+mn-cs"/>
               </a:rPr>
-              <a:t>The next problem which is the core problem is: How to reuse physical nodes? Then we model the problem,  For a new coming service chain, it is hard to find its optimal reused factor, and we can transmit a point to solve the problem, assume there are infinite same service function chains, and find a factor and length to make the number which can be deployed in the network maximum. The transform based on the fact that compared with service function chain, the node resources and edge resources of the network is numerous, and if we reuse some nodes of SFC in this step, for a next same function chain, there will also be reused nodes.   Then we get the rule. And the comparison of the computing resources and bandwidth resources is a vector </a:t>
+              <a:t>The </a:t>
+            </a:r>
+            <a:r>
+              <a:rPr lang="en-US" altLang="zh-CN" sz="1200" kern="1200" dirty="0" smtClean="0">
+                <a:solidFill>
+                  <a:schemeClr val="tx1"/>
+                </a:solidFill>
+                <a:effectLst/>
+                <a:latin typeface="+mn-lt"/>
+                <a:ea typeface="+mn-ea"/>
+                <a:cs typeface="+mn-cs"/>
+              </a:rPr>
+              <a:t>next problem which is the core problem is: How to reuse physical nodes? Then we model the problem,  For a new coming service chain, it is hard to find its optimal reused factor, and we can </a:t>
+            </a:r>
+            <a:r>
+              <a:rPr lang="en-US" altLang="zh-CN" sz="1200" kern="1200" dirty="0" smtClean="0">
+                <a:solidFill>
+                  <a:schemeClr val="tx1"/>
+                </a:solidFill>
+                <a:effectLst/>
+                <a:latin typeface="+mn-lt"/>
+                <a:ea typeface="+mn-ea"/>
+                <a:cs typeface="+mn-cs"/>
+              </a:rPr>
+              <a:t>transform </a:t>
+            </a:r>
+            <a:r>
+              <a:rPr lang="en-US" altLang="zh-CN" sz="1200" kern="1200" dirty="0" smtClean="0">
+                <a:solidFill>
+                  <a:schemeClr val="tx1"/>
+                </a:solidFill>
+                <a:effectLst/>
+                <a:latin typeface="+mn-lt"/>
+                <a:ea typeface="+mn-ea"/>
+                <a:cs typeface="+mn-cs"/>
+              </a:rPr>
+              <a:t>a point to solve the problem, assume there are infinite same service function chains, and find a factor and length to make the number which can be deployed in the network maximum. The transform based on the fact that compared with service function chain, the node resources and edge resources of the network is numerous, and if we reuse some nodes of SFC in this step, for a next same function chain, there will also be reused nodes.   Then we get the rule. And the comparison of the computing resources and bandwidth resources is a vector </a:t>
             </a:r>
             <a:r>
               <a:rPr lang="en-US" altLang="zh-CN" sz="1200" kern="1200" dirty="0" err="1" smtClean="0">
@@ -3032,6 +3295,47 @@
               </a:rPr>
               <a:t>.</a:t>
             </a:r>
+            <a:endParaRPr lang="zh-CN" altLang="en-US" sz="1200" kern="1200" dirty="0" smtClean="0">
+              <a:solidFill>
+                <a:schemeClr val="tx1"/>
+              </a:solidFill>
+              <a:effectLst/>
+              <a:latin typeface="+mn-lt"/>
+              <a:ea typeface="+mn-ea"/>
+              <a:cs typeface="+mn-cs"/>
+            </a:endParaRPr>
+          </a:p>
+          <a:p>
+            <a:r>
+              <a:rPr lang="zh-CN" altLang="en-US" dirty="0" smtClean="0"/>
+              <a:t>为什么对于无限多服务链可以成立，是因为这是相比较服务链来说，虚拟机上的节点和资源是巨大的，因此重用因子主要取决于服务链，而不取决于虚拟机。</a:t>
+            </a:r>
+            <a:endParaRPr lang="en-US" altLang="zh-CN" dirty="0" smtClean="0"/>
+          </a:p>
+          <a:p>
+            <a:r>
+              <a:rPr lang="zh-CN" altLang="en-US" dirty="0" smtClean="0"/>
+              <a:t>同时这里节点的可用和资源的可用是一个向量的比较，而非标量的比较。</a:t>
+            </a:r>
+          </a:p>
+          <a:p>
+            <a:pPr marL="0" marR="0" lvl="0" indent="0" algn="l" defTabSz="914400" rtl="0" eaLnBrk="1" fontAlgn="auto" latinLnBrk="0" hangingPunct="1">
+              <a:lnSpc>
+                <a:spcPct val="100000"/>
+              </a:lnSpc>
+              <a:spcBef>
+                <a:spcPts val="0"/>
+              </a:spcBef>
+              <a:spcAft>
+                <a:spcPts val="0"/>
+              </a:spcAft>
+              <a:buClrTx/>
+              <a:buSzTx/>
+              <a:buFontTx/>
+              <a:buNone/>
+              <a:tabLst/>
+              <a:defRPr/>
+            </a:pPr>
             <a:endParaRPr lang="zh-CN" altLang="zh-CN" sz="1200" kern="1200" dirty="0" smtClean="0">
               <a:solidFill>
                 <a:schemeClr val="tx1"/>
@@ -3901,54 +4205,7 @@
                 <a:ea typeface="+mn-ea"/>
                 <a:cs typeface="+mn-cs"/>
               </a:rPr>
-              <a:t> protection, IDS, ad insertion, BRAS</a:t>
-            </a:r>
-            <a:r>
-              <a:rPr lang="en-US" altLang="zh-CN" sz="1200" kern="1200" dirty="0" smtClean="0">
-                <a:solidFill>
-                  <a:schemeClr val="tx1"/>
-                </a:solidFill>
-                <a:effectLst/>
-                <a:latin typeface="+mn-lt"/>
-                <a:ea typeface="+mn-ea"/>
-                <a:cs typeface="+mn-cs"/>
-              </a:rPr>
-              <a:t>.</a:t>
-            </a:r>
-            <a:endParaRPr lang="zh-CN" altLang="en-US" sz="1200" kern="1200" dirty="0" smtClean="0">
-              <a:solidFill>
-                <a:schemeClr val="tx1"/>
-              </a:solidFill>
-              <a:effectLst/>
-              <a:latin typeface="+mn-lt"/>
-              <a:ea typeface="+mn-ea"/>
-              <a:cs typeface="+mn-cs"/>
-            </a:endParaRPr>
-          </a:p>
-          <a:p>
-            <a:r>
-              <a:rPr lang="en-US" altLang="zh-CN" sz="1200" kern="1200" dirty="0" smtClean="0">
-                <a:solidFill>
-                  <a:schemeClr val="tx1"/>
-                </a:solidFill>
-                <a:effectLst/>
-                <a:latin typeface="+mn-lt"/>
-                <a:ea typeface="+mn-ea"/>
-                <a:cs typeface="+mn-cs"/>
-              </a:rPr>
-              <a:t> </a:t>
-            </a:r>
-            <a:r>
-              <a:rPr lang="en-US" altLang="zh-CN" sz="1200" kern="1200" dirty="0" smtClean="0">
-                <a:solidFill>
-                  <a:schemeClr val="tx1"/>
-                </a:solidFill>
-                <a:effectLst/>
-                <a:latin typeface="+mn-lt"/>
-                <a:ea typeface="+mn-ea"/>
-                <a:cs typeface="+mn-cs"/>
-              </a:rPr>
-              <a:t>But Hardware </a:t>
+              <a:t> protection, IDS, ad insertion, BRAS. But Hardware </a:t>
             </a:r>
             <a:r>
               <a:rPr lang="en-US" altLang="zh-CN" sz="1200" kern="1200" dirty="0" err="1" smtClean="0">
@@ -3972,54 +4229,7 @@
                 <a:ea typeface="+mn-ea"/>
                 <a:cs typeface="+mn-cs"/>
               </a:rPr>
-              <a:t> have many drawbacks. for example: Expensive equipment/power costs, Difficult to add new features, Difficult to manage, Cannot be scaled on demand</a:t>
-            </a:r>
-            <a:r>
-              <a:rPr lang="en-US" altLang="zh-CN" sz="1200" kern="1200" dirty="0" smtClean="0">
-                <a:solidFill>
-                  <a:schemeClr val="tx1"/>
-                </a:solidFill>
-                <a:effectLst/>
-                <a:latin typeface="+mn-lt"/>
-                <a:ea typeface="+mn-ea"/>
-                <a:cs typeface="+mn-cs"/>
-              </a:rPr>
-              <a:t>.</a:t>
-            </a:r>
-            <a:endParaRPr lang="zh-CN" altLang="en-US" sz="1200" kern="1200" smtClean="0">
-              <a:solidFill>
-                <a:schemeClr val="tx1"/>
-              </a:solidFill>
-              <a:effectLst/>
-              <a:latin typeface="+mn-lt"/>
-              <a:ea typeface="+mn-ea"/>
-              <a:cs typeface="+mn-cs"/>
-            </a:endParaRPr>
-          </a:p>
-          <a:p>
-            <a:r>
-              <a:rPr lang="en-US" altLang="zh-CN" sz="1200" kern="1200" smtClean="0">
-                <a:solidFill>
-                  <a:schemeClr val="tx1"/>
-                </a:solidFill>
-                <a:effectLst/>
-                <a:latin typeface="+mn-lt"/>
-                <a:ea typeface="+mn-ea"/>
-                <a:cs typeface="+mn-cs"/>
-              </a:rPr>
-              <a:t> </a:t>
-            </a:r>
-            <a:r>
-              <a:rPr lang="en-US" altLang="zh-CN" sz="1200" kern="1200" dirty="0" smtClean="0">
-                <a:solidFill>
-                  <a:schemeClr val="tx1"/>
-                </a:solidFill>
-                <a:effectLst/>
-                <a:latin typeface="+mn-lt"/>
-                <a:ea typeface="+mn-ea"/>
-                <a:cs typeface="+mn-cs"/>
-              </a:rPr>
-              <a:t>However, by separating network function from the underlying hardware, the deployment will be more flexible. So we can deploy network function in virtual network. And how to deploy dynamic, flexible and robust service functions is an attractive and useful problem.</a:t>
+              <a:t> have many drawbacks. for example: Expensive equipment/power costs, Difficult to add new features, Difficult to manage, Cannot be scaled on demand. However, by separating network function from the underlying hardware, the deployment will be more flexible. So we can deploy network function in virtual network. And how to deploy dynamic, flexible and robust service functions is an attractive and useful problem.</a:t>
             </a:r>
             <a:r>
               <a:rPr lang="zh-CN" altLang="zh-CN" dirty="0" smtClean="0">
@@ -5007,7 +5217,7 @@
                 <a:ea typeface="+mn-ea"/>
                 <a:cs typeface="+mn-cs"/>
               </a:rPr>
-              <a:t>Resources Allocation of SFC. Deploy virtual nodes to the physical nodes if the node computing resources and edge bandwidth is enough. Input: a physical network and a SFC set. Output: a network function deployment. This problem is similar to the problem we talk today, and the difference between them are: first, A physical node can be deployed with many functions in this problem. Second, No share function node. Also, the problem is Fixed requirements. </a:t>
+              <a:t>Resources Allocation of SFC. Deploy virtual nodes to the physical nodes if the node computing resources and edge bandwidth is enough. Input: a physical network and a SFC set. Output: a network function deployment. This problem is similar to the problem we talk today, and the differences between them are: first, A physical node can be deployed with many functions in this problem. Second, No share function node. Also, the problem is Fixed requirements. </a:t>
             </a:r>
             <a:endParaRPr lang="zh-CN" altLang="zh-CN" sz="1200" kern="1200" dirty="0" smtClean="0">
               <a:solidFill>
@@ -5131,7 +5341,7 @@
                 <a:ea typeface="+mn-ea"/>
                 <a:cs typeface="+mn-cs"/>
               </a:rPr>
-              <a:t>Virtual Machine Deployment. Users requirement are deployed in the virtual machines, and virtual machine are deployed in the physical network. the problem is to find a suitable place for virtual machine. So this problem is the next step of our problem.</a:t>
+              <a:t>Virtual Machine Deployment. User requirement are deployed in the virtual machines, and virtual machine are deployed in the physical network. the problem is to find a suitable place for virtual machine. So this problem is the next step of our problem.</a:t>
             </a:r>
             <a:endParaRPr lang="zh-CN" altLang="zh-CN" sz="1200" kern="1200" dirty="0" smtClean="0">
               <a:solidFill>
@@ -5255,7 +5465,55 @@
                 <a:ea typeface="+mn-ea"/>
                 <a:cs typeface="+mn-cs"/>
               </a:rPr>
-              <a:t>Virtual Network Embedding. Embedded a virtual network to a physical network. In this figure, we need to embed the upper virtual network to the physical network. It also take allocation of node resources and edge resources into account. (here is the simplify ) and the differences is: it is an undirected cyclic graph. And we talk today is a DAG.</a:t>
+              <a:t>Virtual Network Embedding. </a:t>
+            </a:r>
+            <a:r>
+              <a:rPr lang="en-US" altLang="zh-CN" sz="1200" kern="1200" dirty="0" smtClean="0">
+                <a:solidFill>
+                  <a:schemeClr val="tx1"/>
+                </a:solidFill>
+                <a:effectLst/>
+                <a:latin typeface="+mn-lt"/>
+                <a:ea typeface="+mn-ea"/>
+                <a:cs typeface="+mn-cs"/>
+              </a:rPr>
+              <a:t>Embed </a:t>
+            </a:r>
+            <a:r>
+              <a:rPr lang="en-US" altLang="zh-CN" sz="1200" kern="1200" dirty="0" smtClean="0">
+                <a:solidFill>
+                  <a:schemeClr val="tx1"/>
+                </a:solidFill>
+                <a:effectLst/>
+                <a:latin typeface="+mn-lt"/>
+                <a:ea typeface="+mn-ea"/>
+                <a:cs typeface="+mn-cs"/>
+              </a:rPr>
+              <a:t>a virtual network to a physical network. In this figure, we need to embed the upper virtual network to the physical network. It also take allocation of node resources and edge resources into account. (here is the simplify ) and the </a:t>
+            </a:r>
+            <a:r>
+              <a:rPr lang="en-US" altLang="zh-CN" sz="1200" kern="1200" dirty="0" smtClean="0">
+                <a:solidFill>
+                  <a:schemeClr val="tx1"/>
+                </a:solidFill>
+                <a:effectLst/>
+                <a:latin typeface="+mn-lt"/>
+                <a:ea typeface="+mn-ea"/>
+                <a:cs typeface="+mn-cs"/>
+              </a:rPr>
+              <a:t>difference </a:t>
+            </a:r>
+            <a:r>
+              <a:rPr lang="en-US" altLang="zh-CN" sz="1200" kern="1200" dirty="0" smtClean="0">
+                <a:solidFill>
+                  <a:schemeClr val="tx1"/>
+                </a:solidFill>
+                <a:effectLst/>
+                <a:latin typeface="+mn-lt"/>
+                <a:ea typeface="+mn-ea"/>
+                <a:cs typeface="+mn-cs"/>
+              </a:rPr>
+              <a:t>is: it is an undirected cyclic graph. And we talk today is a DAG.</a:t>
             </a:r>
             <a:endParaRPr lang="zh-CN" altLang="zh-CN" sz="1200" kern="1200" dirty="0" smtClean="0">
               <a:solidFill>
@@ -5735,7 +5993,7 @@
           <a:p>
             <a:fld id="{71B24F77-D39D-A04C-9AB7-9EDA183ECF7C}" type="datetimeFigureOut">
               <a:rPr kumimoji="1" lang="zh-CN" altLang="en-US" smtClean="0"/>
-              <a:t>2017/12/10</a:t>
+              <a:t>2017/12/12</a:t>
             </a:fld>
             <a:endParaRPr kumimoji="1" lang="zh-CN" altLang="en-US"/>
           </a:p>
@@ -5905,7 +6163,7 @@
           <a:p>
             <a:fld id="{71B24F77-D39D-A04C-9AB7-9EDA183ECF7C}" type="datetimeFigureOut">
               <a:rPr kumimoji="1" lang="zh-CN" altLang="en-US" smtClean="0"/>
-              <a:t>2017/12/10</a:t>
+              <a:t>2017/12/12</a:t>
             </a:fld>
             <a:endParaRPr kumimoji="1" lang="zh-CN" altLang="en-US"/>
           </a:p>
@@ -6085,7 +6343,7 @@
           <a:p>
             <a:fld id="{71B24F77-D39D-A04C-9AB7-9EDA183ECF7C}" type="datetimeFigureOut">
               <a:rPr kumimoji="1" lang="zh-CN" altLang="en-US" smtClean="0"/>
-              <a:t>2017/12/10</a:t>
+              <a:t>2017/12/12</a:t>
             </a:fld>
             <a:endParaRPr kumimoji="1" lang="zh-CN" altLang="en-US"/>
           </a:p>
@@ -6255,7 +6513,7 @@
           <a:p>
             <a:fld id="{71B24F77-D39D-A04C-9AB7-9EDA183ECF7C}" type="datetimeFigureOut">
               <a:rPr kumimoji="1" lang="zh-CN" altLang="en-US" smtClean="0"/>
-              <a:t>2017/12/10</a:t>
+              <a:t>2017/12/12</a:t>
             </a:fld>
             <a:endParaRPr kumimoji="1" lang="zh-CN" altLang="en-US"/>
           </a:p>
@@ -6501,7 +6759,7 @@
           <a:p>
             <a:fld id="{71B24F77-D39D-A04C-9AB7-9EDA183ECF7C}" type="datetimeFigureOut">
               <a:rPr kumimoji="1" lang="zh-CN" altLang="en-US" smtClean="0"/>
-              <a:t>2017/12/10</a:t>
+              <a:t>2017/12/12</a:t>
             </a:fld>
             <a:endParaRPr kumimoji="1" lang="zh-CN" altLang="en-US"/>
           </a:p>
@@ -6733,7 +6991,7 @@
           <a:p>
             <a:fld id="{71B24F77-D39D-A04C-9AB7-9EDA183ECF7C}" type="datetimeFigureOut">
               <a:rPr kumimoji="1" lang="zh-CN" altLang="en-US" smtClean="0"/>
-              <a:t>2017/12/10</a:t>
+              <a:t>2017/12/12</a:t>
             </a:fld>
             <a:endParaRPr kumimoji="1" lang="zh-CN" altLang="en-US"/>
           </a:p>
@@ -7100,7 +7358,7 @@
           <a:p>
             <a:fld id="{71B24F77-D39D-A04C-9AB7-9EDA183ECF7C}" type="datetimeFigureOut">
               <a:rPr kumimoji="1" lang="zh-CN" altLang="en-US" smtClean="0"/>
-              <a:t>2017/12/10</a:t>
+              <a:t>2017/12/12</a:t>
             </a:fld>
             <a:endParaRPr kumimoji="1" lang="zh-CN" altLang="en-US"/>
           </a:p>
@@ -7218,7 +7476,7 @@
           <a:p>
             <a:fld id="{71B24F77-D39D-A04C-9AB7-9EDA183ECF7C}" type="datetimeFigureOut">
               <a:rPr kumimoji="1" lang="zh-CN" altLang="en-US" smtClean="0"/>
-              <a:t>2017/12/10</a:t>
+              <a:t>2017/12/12</a:t>
             </a:fld>
             <a:endParaRPr kumimoji="1" lang="zh-CN" altLang="en-US"/>
           </a:p>
@@ -7313,7 +7571,7 @@
           <a:p>
             <a:fld id="{71B24F77-D39D-A04C-9AB7-9EDA183ECF7C}" type="datetimeFigureOut">
               <a:rPr kumimoji="1" lang="zh-CN" altLang="en-US" smtClean="0"/>
-              <a:t>2017/12/10</a:t>
+              <a:t>2017/12/12</a:t>
             </a:fld>
             <a:endParaRPr kumimoji="1" lang="zh-CN" altLang="en-US"/>
           </a:p>
@@ -7590,7 +7848,7 @@
           <a:p>
             <a:fld id="{71B24F77-D39D-A04C-9AB7-9EDA183ECF7C}" type="datetimeFigureOut">
               <a:rPr kumimoji="1" lang="zh-CN" altLang="en-US" smtClean="0"/>
-              <a:t>2017/12/10</a:t>
+              <a:t>2017/12/12</a:t>
             </a:fld>
             <a:endParaRPr kumimoji="1" lang="zh-CN" altLang="en-US"/>
           </a:p>
@@ -7843,7 +8101,7 @@
           <a:p>
             <a:fld id="{71B24F77-D39D-A04C-9AB7-9EDA183ECF7C}" type="datetimeFigureOut">
               <a:rPr kumimoji="1" lang="zh-CN" altLang="en-US" smtClean="0"/>
-              <a:t>2017/12/10</a:t>
+              <a:t>2017/12/12</a:t>
             </a:fld>
             <a:endParaRPr kumimoji="1" lang="zh-CN" altLang="en-US"/>
           </a:p>
@@ -8056,7 +8314,7 @@
           <a:p>
             <a:fld id="{71B24F77-D39D-A04C-9AB7-9EDA183ECF7C}" type="datetimeFigureOut">
               <a:rPr kumimoji="1" lang="zh-CN" altLang="en-US" smtClean="0"/>
-              <a:t>2017/12/10</a:t>
+              <a:t>2017/12/12</a:t>
             </a:fld>
             <a:endParaRPr kumimoji="1" lang="zh-CN" altLang="en-US"/>
           </a:p>
@@ -10784,7 +11042,11 @@
             </a:r>
             <a:r>
               <a:rPr lang="en-US" altLang="zh-CN" sz="2800" dirty="0"/>
-              <a:t>is 10 and the floating requirement of node a is 5 and the possibility is 0.3.</a:t>
+              <a:t>is 10 and the floating requirement of node a is 5 and the possibility is </a:t>
+            </a:r>
+            <a:r>
+              <a:rPr lang="en-US" altLang="zh-CN" sz="2800" dirty="0" smtClean="0"/>
+              <a:t>0.5.</a:t>
             </a:r>
             <a:endParaRPr lang="zh-CN" altLang="en-US" sz="2800" dirty="0"/>
           </a:p>
@@ -13655,7 +13917,7 @@
               <a:effectLst/>
               <a:extLst>
                 <a:ext uri="{909E8E84-426E-40dd-AFC4-6F175D3DCCD1}">
-                  <a14:hiddenFill xmlns="" xmlns:a14="http://schemas.microsoft.com/office/drawing/2010/main">
+                  <a14:hiddenFill xmlns:a14="http://schemas.microsoft.com/office/drawing/2010/main" xmlns="">
                     <a:blipFill dpi="0" rotWithShape="0">
                       <a:blip/>
                       <a:srcRect/>
@@ -13666,7 +13928,7 @@
                   </a14:hiddenFill>
                 </a:ext>
                 <a:ext uri="{91240B29-F687-4f45-9708-019B960494DF}">
-                  <a14:hiddenLine xmlns="" xmlns:a14="http://schemas.microsoft.com/office/drawing/2010/main" w="9525" cap="flat">
+                  <a14:hiddenLine xmlns:a14="http://schemas.microsoft.com/office/drawing/2010/main" xmlns="" w="9525" cap="flat">
                     <a:solidFill>
                       <a:srgbClr val="3465AF"/>
                     </a:solidFill>
@@ -13676,7 +13938,7 @@
                   </a14:hiddenLine>
                 </a:ext>
                 <a:ext uri="{AF507438-7753-43e0-B8FC-AC1667EBCBE1}">
-                  <a14:hiddenEffects xmlns="" xmlns:a14="http://schemas.microsoft.com/office/drawing/2010/main">
+                  <a14:hiddenEffects xmlns:a14="http://schemas.microsoft.com/office/drawing/2010/main" xmlns="">
                     <a:effectLst>
                       <a:outerShdw blurRad="63500" dist="38099" dir="2700000" algn="ctr" rotWithShape="0">
                         <a:srgbClr val="000000">
@@ -13712,14 +13974,14 @@
               <a:effectLst/>
               <a:extLst>
                 <a:ext uri="{909E8E84-426E-40dd-AFC4-6F175D3DCCD1}">
-                  <a14:hiddenFill xmlns="" xmlns:a14="http://schemas.microsoft.com/office/drawing/2010/main">
+                  <a14:hiddenFill xmlns:a14="http://schemas.microsoft.com/office/drawing/2010/main" xmlns="">
                     <a:solidFill>
                       <a:srgbClr val="FFFFFF"/>
                     </a:solidFill>
                   </a14:hiddenFill>
                 </a:ext>
                 <a:ext uri="{91240B29-F687-4f45-9708-019B960494DF}">
-                  <a14:hiddenLine xmlns="" xmlns:a14="http://schemas.microsoft.com/office/drawing/2010/main" w="9525" cap="flat">
+                  <a14:hiddenLine xmlns:a14="http://schemas.microsoft.com/office/drawing/2010/main" xmlns="" w="9525" cap="flat">
                     <a:solidFill>
                       <a:srgbClr val="3465AF"/>
                     </a:solidFill>
@@ -13729,7 +13991,7 @@
                   </a14:hiddenLine>
                 </a:ext>
                 <a:ext uri="{AF507438-7753-43e0-B8FC-AC1667EBCBE1}">
-                  <a14:hiddenEffects xmlns="" xmlns:a14="http://schemas.microsoft.com/office/drawing/2010/main">
+                  <a14:hiddenEffects xmlns:a14="http://schemas.microsoft.com/office/drawing/2010/main" xmlns="">
                     <a:effectLst>
                       <a:outerShdw blurRad="63500" dist="38099" dir="2700000" algn="ctr" rotWithShape="0">
                         <a:srgbClr val="000000">
@@ -14166,7 +14428,7 @@
               <a:effectLst/>
               <a:extLst>
                 <a:ext uri="{909E8E84-426E-40dd-AFC4-6F175D3DCCD1}">
-                  <a14:hiddenFill xmlns="" xmlns:a14="http://schemas.microsoft.com/office/drawing/2010/main">
+                  <a14:hiddenFill xmlns:a14="http://schemas.microsoft.com/office/drawing/2010/main" xmlns="">
                     <a:blipFill dpi="0" rotWithShape="0">
                       <a:blip/>
                       <a:srcRect/>
@@ -14177,7 +14439,7 @@
                   </a14:hiddenFill>
                 </a:ext>
                 <a:ext uri="{91240B29-F687-4f45-9708-019B960494DF}">
-                  <a14:hiddenLine xmlns="" xmlns:a14="http://schemas.microsoft.com/office/drawing/2010/main" w="9525" cap="flat">
+                  <a14:hiddenLine xmlns:a14="http://schemas.microsoft.com/office/drawing/2010/main" xmlns="" w="9525" cap="flat">
                     <a:solidFill>
                       <a:srgbClr val="3465AF"/>
                     </a:solidFill>
@@ -14187,7 +14449,7 @@
                   </a14:hiddenLine>
                 </a:ext>
                 <a:ext uri="{AF507438-7753-43e0-B8FC-AC1667EBCBE1}">
-                  <a14:hiddenEffects xmlns="" xmlns:a14="http://schemas.microsoft.com/office/drawing/2010/main">
+                  <a14:hiddenEffects xmlns:a14="http://schemas.microsoft.com/office/drawing/2010/main" xmlns="">
                     <a:effectLst>
                       <a:outerShdw blurRad="63500" dist="38099" dir="2700000" algn="ctr" rotWithShape="0">
                         <a:srgbClr val="000000">
@@ -14223,14 +14485,14 @@
               <a:effectLst/>
               <a:extLst>
                 <a:ext uri="{909E8E84-426E-40dd-AFC4-6F175D3DCCD1}">
-                  <a14:hiddenFill xmlns="" xmlns:a14="http://schemas.microsoft.com/office/drawing/2010/main">
+                  <a14:hiddenFill xmlns:a14="http://schemas.microsoft.com/office/drawing/2010/main" xmlns="">
                     <a:solidFill>
                       <a:srgbClr val="FFFFFF"/>
                     </a:solidFill>
                   </a14:hiddenFill>
                 </a:ext>
                 <a:ext uri="{91240B29-F687-4f45-9708-019B960494DF}">
-                  <a14:hiddenLine xmlns="" xmlns:a14="http://schemas.microsoft.com/office/drawing/2010/main" w="9525" cap="flat">
+                  <a14:hiddenLine xmlns:a14="http://schemas.microsoft.com/office/drawing/2010/main" xmlns="" w="9525" cap="flat">
                     <a:solidFill>
                       <a:srgbClr val="3465AF"/>
                     </a:solidFill>
@@ -14240,7 +14502,7 @@
                   </a14:hiddenLine>
                 </a:ext>
                 <a:ext uri="{AF507438-7753-43e0-B8FC-AC1667EBCBE1}">
-                  <a14:hiddenEffects xmlns="" xmlns:a14="http://schemas.microsoft.com/office/drawing/2010/main">
+                  <a14:hiddenEffects xmlns:a14="http://schemas.microsoft.com/office/drawing/2010/main" xmlns="">
                     <a:effectLst>
                       <a:outerShdw blurRad="63500" dist="38099" dir="2700000" algn="ctr" rotWithShape="0">
                         <a:srgbClr val="000000">
@@ -14669,7 +14931,7 @@
               <a:effectLst/>
               <a:extLst>
                 <a:ext uri="{909E8E84-426E-40dd-AFC4-6F175D3DCCD1}">
-                  <a14:hiddenFill xmlns="" xmlns:a14="http://schemas.microsoft.com/office/drawing/2010/main">
+                  <a14:hiddenFill xmlns:a14="http://schemas.microsoft.com/office/drawing/2010/main" xmlns="">
                     <a:blipFill dpi="0" rotWithShape="0">
                       <a:blip/>
                       <a:srcRect/>
@@ -14680,7 +14942,7 @@
                   </a14:hiddenFill>
                 </a:ext>
                 <a:ext uri="{91240B29-F687-4f45-9708-019B960494DF}">
-                  <a14:hiddenLine xmlns="" xmlns:a14="http://schemas.microsoft.com/office/drawing/2010/main" w="9525" cap="flat">
+                  <a14:hiddenLine xmlns:a14="http://schemas.microsoft.com/office/drawing/2010/main" xmlns="" w="9525" cap="flat">
                     <a:solidFill>
                       <a:srgbClr val="3465AF"/>
                     </a:solidFill>
@@ -14690,7 +14952,7 @@
                   </a14:hiddenLine>
                 </a:ext>
                 <a:ext uri="{AF507438-7753-43e0-B8FC-AC1667EBCBE1}">
-                  <a14:hiddenEffects xmlns="" xmlns:a14="http://schemas.microsoft.com/office/drawing/2010/main">
+                  <a14:hiddenEffects xmlns:a14="http://schemas.microsoft.com/office/drawing/2010/main" xmlns="">
                     <a:effectLst>
                       <a:outerShdw blurRad="63500" dist="38099" dir="2700000" algn="ctr" rotWithShape="0">
                         <a:srgbClr val="000000">
@@ -14726,14 +14988,14 @@
               <a:effectLst/>
               <a:extLst>
                 <a:ext uri="{909E8E84-426E-40dd-AFC4-6F175D3DCCD1}">
-                  <a14:hiddenFill xmlns="" xmlns:a14="http://schemas.microsoft.com/office/drawing/2010/main">
+                  <a14:hiddenFill xmlns:a14="http://schemas.microsoft.com/office/drawing/2010/main" xmlns="">
                     <a:solidFill>
                       <a:srgbClr val="FFFFFF"/>
                     </a:solidFill>
                   </a14:hiddenFill>
                 </a:ext>
                 <a:ext uri="{91240B29-F687-4f45-9708-019B960494DF}">
-                  <a14:hiddenLine xmlns="" xmlns:a14="http://schemas.microsoft.com/office/drawing/2010/main" w="9525" cap="flat">
+                  <a14:hiddenLine xmlns:a14="http://schemas.microsoft.com/office/drawing/2010/main" xmlns="" w="9525" cap="flat">
                     <a:solidFill>
                       <a:srgbClr val="3465AF"/>
                     </a:solidFill>
@@ -14743,7 +15005,7 @@
                   </a14:hiddenLine>
                 </a:ext>
                 <a:ext uri="{AF507438-7753-43e0-B8FC-AC1667EBCBE1}">
-                  <a14:hiddenEffects xmlns="" xmlns:a14="http://schemas.microsoft.com/office/drawing/2010/main">
+                  <a14:hiddenEffects xmlns:a14="http://schemas.microsoft.com/office/drawing/2010/main" xmlns="">
                     <a:effectLst>
                       <a:outerShdw blurRad="63500" dist="38099" dir="2700000" algn="ctr" rotWithShape="0">
                         <a:srgbClr val="000000">
@@ -15189,7 +15451,7 @@
               <a:effectLst/>
               <a:extLst>
                 <a:ext uri="{909E8E84-426E-40dd-AFC4-6F175D3DCCD1}">
-                  <a14:hiddenFill xmlns:lc="http://schemas.openxmlformats.org/drawingml/2006/lockedCanvas" xmlns:a14="http://schemas.microsoft.com/office/drawing/2010/main" xmlns="">
+                  <a14:hiddenFill xmlns="" xmlns:a14="http://schemas.microsoft.com/office/drawing/2010/main" xmlns:lc="http://schemas.openxmlformats.org/drawingml/2006/lockedCanvas">
                     <a:blipFill dpi="0" rotWithShape="0">
                       <a:blip/>
                       <a:srcRect/>
@@ -15200,7 +15462,7 @@
                   </a14:hiddenFill>
                 </a:ext>
                 <a:ext uri="{91240B29-F687-4f45-9708-019B960494DF}">
-                  <a14:hiddenLine xmlns:lc="http://schemas.openxmlformats.org/drawingml/2006/lockedCanvas" xmlns:a14="http://schemas.microsoft.com/office/drawing/2010/main" xmlns="" w="9525" cap="flat">
+                  <a14:hiddenLine xmlns="" xmlns:a14="http://schemas.microsoft.com/office/drawing/2010/main" xmlns:lc="http://schemas.openxmlformats.org/drawingml/2006/lockedCanvas" w="9525" cap="flat">
                     <a:solidFill>
                       <a:srgbClr val="3465AF"/>
                     </a:solidFill>
@@ -15210,7 +15472,7 @@
                   </a14:hiddenLine>
                 </a:ext>
                 <a:ext uri="{AF507438-7753-43e0-B8FC-AC1667EBCBE1}">
-                  <a14:hiddenEffects xmlns:lc="http://schemas.openxmlformats.org/drawingml/2006/lockedCanvas" xmlns:a14="http://schemas.microsoft.com/office/drawing/2010/main" xmlns="">
+                  <a14:hiddenEffects xmlns="" xmlns:a14="http://schemas.microsoft.com/office/drawing/2010/main" xmlns:lc="http://schemas.openxmlformats.org/drawingml/2006/lockedCanvas">
                     <a:effectLst>
                       <a:outerShdw blurRad="63500" dist="38099" dir="2700000" algn="ctr" rotWithShape="0">
                         <a:srgbClr val="000000">
@@ -15246,14 +15508,14 @@
               <a:effectLst/>
               <a:extLst>
                 <a:ext uri="{909E8E84-426E-40dd-AFC4-6F175D3DCCD1}">
-                  <a14:hiddenFill xmlns:lc="http://schemas.openxmlformats.org/drawingml/2006/lockedCanvas" xmlns:a14="http://schemas.microsoft.com/office/drawing/2010/main" xmlns="">
+                  <a14:hiddenFill xmlns="" xmlns:a14="http://schemas.microsoft.com/office/drawing/2010/main" xmlns:lc="http://schemas.openxmlformats.org/drawingml/2006/lockedCanvas">
                     <a:solidFill>
                       <a:srgbClr val="FFFFFF"/>
                     </a:solidFill>
                   </a14:hiddenFill>
                 </a:ext>
                 <a:ext uri="{91240B29-F687-4f45-9708-019B960494DF}">
-                  <a14:hiddenLine xmlns:lc="http://schemas.openxmlformats.org/drawingml/2006/lockedCanvas" xmlns:a14="http://schemas.microsoft.com/office/drawing/2010/main" xmlns="" w="9525" cap="flat">
+                  <a14:hiddenLine xmlns="" xmlns:a14="http://schemas.microsoft.com/office/drawing/2010/main" xmlns:lc="http://schemas.openxmlformats.org/drawingml/2006/lockedCanvas" w="9525" cap="flat">
                     <a:solidFill>
                       <a:srgbClr val="3465AF"/>
                     </a:solidFill>
@@ -15263,7 +15525,7 @@
                   </a14:hiddenLine>
                 </a:ext>
                 <a:ext uri="{AF507438-7753-43e0-B8FC-AC1667EBCBE1}">
-                  <a14:hiddenEffects xmlns:lc="http://schemas.openxmlformats.org/drawingml/2006/lockedCanvas" xmlns:a14="http://schemas.microsoft.com/office/drawing/2010/main" xmlns="">
+                  <a14:hiddenEffects xmlns="" xmlns:a14="http://schemas.microsoft.com/office/drawing/2010/main" xmlns:lc="http://schemas.openxmlformats.org/drawingml/2006/lockedCanvas">
                     <a:effectLst>
                       <a:outerShdw blurRad="63500" dist="38099" dir="2700000" algn="ctr" rotWithShape="0">
                         <a:srgbClr val="000000">
@@ -15444,7 +15706,7 @@
               <a:effectLst/>
               <a:extLst>
                 <a:ext uri="{909E8E84-426E-40dd-AFC4-6F175D3DCCD1}">
-                  <a14:hiddenFill xmlns:lc="http://schemas.openxmlformats.org/drawingml/2006/lockedCanvas" xmlns:a14="http://schemas.microsoft.com/office/drawing/2010/main" xmlns="">
+                  <a14:hiddenFill xmlns="" xmlns:a14="http://schemas.microsoft.com/office/drawing/2010/main" xmlns:lc="http://schemas.openxmlformats.org/drawingml/2006/lockedCanvas">
                     <a:blipFill dpi="0" rotWithShape="0">
                       <a:blip/>
                       <a:srcRect/>
@@ -15455,7 +15717,7 @@
                   </a14:hiddenFill>
                 </a:ext>
                 <a:ext uri="{91240B29-F687-4f45-9708-019B960494DF}">
-                  <a14:hiddenLine xmlns:lc="http://schemas.openxmlformats.org/drawingml/2006/lockedCanvas" xmlns:a14="http://schemas.microsoft.com/office/drawing/2010/main" xmlns="" w="9525" cap="flat">
+                  <a14:hiddenLine xmlns="" xmlns:a14="http://schemas.microsoft.com/office/drawing/2010/main" xmlns:lc="http://schemas.openxmlformats.org/drawingml/2006/lockedCanvas" w="9525" cap="flat">
                     <a:solidFill>
                       <a:srgbClr val="3465AF"/>
                     </a:solidFill>
@@ -15465,7 +15727,7 @@
                   </a14:hiddenLine>
                 </a:ext>
                 <a:ext uri="{AF507438-7753-43e0-B8FC-AC1667EBCBE1}">
-                  <a14:hiddenEffects xmlns:lc="http://schemas.openxmlformats.org/drawingml/2006/lockedCanvas" xmlns:a14="http://schemas.microsoft.com/office/drawing/2010/main" xmlns="">
+                  <a14:hiddenEffects xmlns="" xmlns:a14="http://schemas.microsoft.com/office/drawing/2010/main" xmlns:lc="http://schemas.openxmlformats.org/drawingml/2006/lockedCanvas">
                     <a:effectLst>
                       <a:outerShdw blurRad="63500" dist="38099" dir="2700000" algn="ctr" rotWithShape="0">
                         <a:srgbClr val="000000">
@@ -15501,14 +15763,14 @@
               <a:effectLst/>
               <a:extLst>
                 <a:ext uri="{909E8E84-426E-40dd-AFC4-6F175D3DCCD1}">
-                  <a14:hiddenFill xmlns:lc="http://schemas.openxmlformats.org/drawingml/2006/lockedCanvas" xmlns:a14="http://schemas.microsoft.com/office/drawing/2010/main" xmlns="">
+                  <a14:hiddenFill xmlns="" xmlns:a14="http://schemas.microsoft.com/office/drawing/2010/main" xmlns:lc="http://schemas.openxmlformats.org/drawingml/2006/lockedCanvas">
                     <a:solidFill>
                       <a:srgbClr val="FFFFFF"/>
                     </a:solidFill>
                   </a14:hiddenFill>
                 </a:ext>
                 <a:ext uri="{91240B29-F687-4f45-9708-019B960494DF}">
-                  <a14:hiddenLine xmlns:lc="http://schemas.openxmlformats.org/drawingml/2006/lockedCanvas" xmlns:a14="http://schemas.microsoft.com/office/drawing/2010/main" xmlns="" w="9525" cap="flat">
+                  <a14:hiddenLine xmlns="" xmlns:a14="http://schemas.microsoft.com/office/drawing/2010/main" xmlns:lc="http://schemas.openxmlformats.org/drawingml/2006/lockedCanvas" w="9525" cap="flat">
                     <a:solidFill>
                       <a:srgbClr val="3465AF"/>
                     </a:solidFill>
@@ -15518,7 +15780,7 @@
                   </a14:hiddenLine>
                 </a:ext>
                 <a:ext uri="{AF507438-7753-43e0-B8FC-AC1667EBCBE1}">
-                  <a14:hiddenEffects xmlns:lc="http://schemas.openxmlformats.org/drawingml/2006/lockedCanvas" xmlns:a14="http://schemas.microsoft.com/office/drawing/2010/main" xmlns="">
+                  <a14:hiddenEffects xmlns="" xmlns:a14="http://schemas.microsoft.com/office/drawing/2010/main" xmlns:lc="http://schemas.openxmlformats.org/drawingml/2006/lockedCanvas">
                     <a:effectLst>
                       <a:outerShdw blurRad="63500" dist="38099" dir="2700000" algn="ctr" rotWithShape="0">
                         <a:srgbClr val="000000">

</xml_diff>